<commit_message>
cropped images + new slide
</commit_message>
<xml_diff>
--- a/code/MasterTemplate.pptx
+++ b/code/MasterTemplate.pptx
@@ -5,8 +5,11 @@
     <p:sldMasterId id="2147483648" r:id="rId1"/>
   </p:sldMasterIdLst>
   <p:notesMasterIdLst>
-    <p:notesMasterId r:id="rId2"/>
+    <p:notesMasterId r:id="rId3"/>
   </p:notesMasterIdLst>
+  <p:sldIdLst>
+    <p:sldId id="256" r:id="rId2"/>
+  </p:sldIdLst>
   <p:sldSz cx="12192000" cy="6858000"/>
   <p:notesSz cx="6858000" cy="9144000"/>
   <p:defaultTextStyle>
@@ -194,7 +197,7 @@
           <a:p>
             <a:fld id="{A9660A2D-5D79-40FF-841A-A622E9A1E27F}" type="datetimeFigureOut">
               <a:rPr lang="en-GB" smtClean="0"/>
-              <a:t>23/11/2020</a:t>
+              <a:t>20/02/2021</a:t>
             </a:fld>
             <a:endParaRPr lang="en-GB"/>
           </a:p>
@@ -3475,6 +3478,643 @@
     </p:otherStyle>
   </p:txStyles>
 </p:sldMaster>
+</file>
+
+<file path=ppt/slides/slide1.xml><?xml version="1.0" encoding="utf-8"?>
+<p:sld xmlns:a="http://schemas.openxmlformats.org/drawingml/2006/main" xmlns:r="http://schemas.openxmlformats.org/officeDocument/2006/relationships" xmlns:p="http://schemas.openxmlformats.org/presentationml/2006/main">
+  <p:cSld>
+    <p:spTree>
+      <p:nvGrpSpPr>
+        <p:cNvPr id="1" name=""/>
+        <p:cNvGrpSpPr/>
+        <p:nvPr/>
+      </p:nvGrpSpPr>
+      <p:grpSpPr>
+        <a:xfrm>
+          <a:off x="0" y="0"/>
+          <a:ext cx="0" cy="0"/>
+          <a:chOff x="0" y="0"/>
+          <a:chExt cx="0" cy="0"/>
+        </a:xfrm>
+      </p:grpSpPr>
+      <p:sp>
+        <p:nvSpPr>
+          <p:cNvPr id="2" name="Title 1">
+            <a:extLst>
+              <a:ext uri="{FF2B5EF4-FFF2-40B4-BE49-F238E27FC236}">
+                <a16:creationId xmlns:a16="http://schemas.microsoft.com/office/drawing/2014/main" id="{40AB5330-6364-4868-80C5-CC3683E612C8}"/>
+              </a:ext>
+            </a:extLst>
+          </p:cNvPr>
+          <p:cNvSpPr>
+            <a:spLocks noGrp="1"/>
+          </p:cNvSpPr>
+          <p:nvPr>
+            <p:ph type="title"/>
+          </p:nvPr>
+        </p:nvSpPr>
+        <p:spPr/>
+        <p:txBody>
+          <a:bodyPr/>
+          <a:lstStyle/>
+          <a:p>
+            <a:r>
+              <a:rPr lang="nl-BE" dirty="0"/>
+              <a:t>STIS </a:t>
+            </a:r>
+            <a:r>
+              <a:rPr lang="nl-BE" dirty="0" err="1"/>
+              <a:t>Repair</a:t>
+            </a:r>
+            <a:r>
+              <a:rPr lang="nl-BE" dirty="0"/>
+              <a:t> Concept </a:t>
+            </a:r>
+            <a:r>
+              <a:rPr lang="nl-BE" dirty="0" err="1"/>
+              <a:t>Still</a:t>
+            </a:r>
+            <a:r>
+              <a:rPr lang="nl-BE" dirty="0"/>
+              <a:t> </a:t>
+            </a:r>
+            <a:r>
+              <a:rPr lang="nl-BE" dirty="0" err="1"/>
+              <a:t>Being</a:t>
+            </a:r>
+            <a:r>
+              <a:rPr lang="nl-BE" dirty="0"/>
+              <a:t> </a:t>
+            </a:r>
+            <a:r>
+              <a:rPr lang="nl-BE" dirty="0" err="1"/>
+              <a:t>Perfected</a:t>
+            </a:r>
+            <a:endParaRPr lang="en-GB" dirty="0"/>
+          </a:p>
+        </p:txBody>
+      </p:sp>
+      <p:sp>
+        <p:nvSpPr>
+          <p:cNvPr id="3" name="Content Placeholder 2">
+            <a:extLst>
+              <a:ext uri="{FF2B5EF4-FFF2-40B4-BE49-F238E27FC236}">
+                <a16:creationId xmlns:a16="http://schemas.microsoft.com/office/drawing/2014/main" id="{837FDF56-D5A9-40D3-B1F1-C5B67656D02F}"/>
+              </a:ext>
+            </a:extLst>
+          </p:cNvPr>
+          <p:cNvSpPr>
+            <a:spLocks noGrp="1"/>
+          </p:cNvSpPr>
+          <p:nvPr>
+            <p:ph sz="half" idx="1"/>
+          </p:nvPr>
+        </p:nvSpPr>
+        <p:spPr/>
+        <p:txBody>
+          <a:bodyPr>
+            <a:normAutofit/>
+          </a:bodyPr>
+          <a:lstStyle/>
+          <a:p>
+            <a:pPr marL="457200" indent="-457200">
+              <a:buFont typeface="Arial" panose="020B0604020202020204" pitchFamily="34" charset="0"/>
+              <a:buChar char="•"/>
+            </a:pPr>
+            <a:endParaRPr lang="nl-BE" sz="2000" dirty="0"/>
+          </a:p>
+          <a:p>
+            <a:pPr marL="457200" indent="-457200">
+              <a:buFont typeface="Arial" panose="020B0604020202020204" pitchFamily="34" charset="0"/>
+              <a:buChar char="•"/>
+            </a:pPr>
+            <a:r>
+              <a:rPr lang="nl-BE" sz="2000" dirty="0"/>
+              <a:t>HST System engineers are </a:t>
+            </a:r>
+            <a:r>
+              <a:rPr lang="nl-BE" sz="2000" dirty="0" err="1"/>
+              <a:t>working</a:t>
+            </a:r>
+            <a:r>
+              <a:rPr lang="nl-BE" sz="2000" dirty="0"/>
+              <a:t> </a:t>
+            </a:r>
+            <a:r>
+              <a:rPr lang="nl-BE" sz="2000" dirty="0" err="1"/>
+              <a:t>with</a:t>
+            </a:r>
+            <a:r>
+              <a:rPr lang="nl-BE" sz="2000" dirty="0"/>
+              <a:t> </a:t>
+            </a:r>
+            <a:r>
+              <a:rPr lang="nl-BE" sz="2000" dirty="0" err="1"/>
+              <a:t>the</a:t>
+            </a:r>
+            <a:r>
+              <a:rPr lang="nl-BE" sz="2000" dirty="0"/>
+              <a:t> crew to </a:t>
+            </a:r>
+            <a:r>
+              <a:rPr lang="nl-BE" sz="2000" dirty="0" err="1"/>
+              <a:t>define</a:t>
+            </a:r>
+            <a:r>
+              <a:rPr lang="nl-BE" sz="2000" dirty="0"/>
+              <a:t> </a:t>
+            </a:r>
+            <a:r>
+              <a:rPr lang="nl-BE" sz="2000" dirty="0" err="1"/>
+              <a:t>the</a:t>
+            </a:r>
+            <a:r>
+              <a:rPr lang="nl-BE" sz="2000" dirty="0"/>
+              <a:t> correct</a:t>
+            </a:r>
+          </a:p>
+          <a:p>
+            <a:pPr marL="900113" lvl="1" indent="-457200"/>
+            <a:r>
+              <a:rPr lang="nl-BE" sz="2000" dirty="0"/>
+              <a:t>Tools</a:t>
+            </a:r>
+          </a:p>
+          <a:p>
+            <a:pPr marL="900113" lvl="1" indent="-457200"/>
+            <a:r>
+              <a:rPr lang="nl-BE" sz="2000" dirty="0"/>
+              <a:t>Procedures</a:t>
+            </a:r>
+          </a:p>
+          <a:p>
+            <a:pPr marL="1446213" lvl="2" indent="-457200"/>
+            <a:r>
+              <a:rPr lang="nl-BE" sz="2000" dirty="0" err="1"/>
+              <a:t>Nominal</a:t>
+            </a:r>
+            <a:endParaRPr lang="nl-BE" sz="2000" dirty="0"/>
+          </a:p>
+          <a:p>
+            <a:pPr marL="1446213" lvl="2" indent="-457200"/>
+            <a:r>
+              <a:rPr lang="nl-BE" sz="2000" dirty="0" err="1"/>
+              <a:t>Contingency</a:t>
+            </a:r>
+            <a:endParaRPr lang="nl-BE" sz="2000" dirty="0"/>
+          </a:p>
+          <a:p>
+            <a:pPr marL="900113" lvl="1" indent="-457200"/>
+            <a:r>
+              <a:rPr lang="nl-BE" sz="2000" dirty="0" err="1"/>
+              <a:t>Timelines</a:t>
+            </a:r>
+            <a:endParaRPr lang="nl-BE" sz="2000" dirty="0"/>
+          </a:p>
+          <a:p>
+            <a:pPr marL="457200" indent="-457200">
+              <a:buFont typeface="Arial" panose="020B0604020202020204" pitchFamily="34" charset="0"/>
+              <a:buChar char="•"/>
+            </a:pPr>
+            <a:r>
+              <a:rPr lang="nl-BE" sz="2000" dirty="0" err="1"/>
+              <a:t>Remember</a:t>
+            </a:r>
+            <a:r>
+              <a:rPr lang="nl-BE" sz="2000" dirty="0"/>
+              <a:t> </a:t>
+            </a:r>
+            <a:r>
+              <a:rPr lang="nl-BE" sz="2000" dirty="0" err="1"/>
+              <a:t>the</a:t>
+            </a:r>
+            <a:r>
+              <a:rPr lang="nl-BE" sz="2000" dirty="0"/>
+              <a:t> </a:t>
+            </a:r>
+            <a:r>
+              <a:rPr lang="nl-BE" sz="2000" dirty="0" err="1"/>
+              <a:t>role</a:t>
+            </a:r>
+            <a:r>
+              <a:rPr lang="nl-BE" sz="2000" dirty="0"/>
+              <a:t> of </a:t>
+            </a:r>
+            <a:r>
+              <a:rPr lang="nl-BE" sz="2000" dirty="0" err="1"/>
+              <a:t>the</a:t>
+            </a:r>
+            <a:r>
+              <a:rPr lang="nl-BE" sz="2000" dirty="0"/>
+              <a:t> system engineer is </a:t>
+            </a:r>
+            <a:r>
+              <a:rPr lang="nl-BE" sz="2000" dirty="0" err="1"/>
+              <a:t>incredibly</a:t>
+            </a:r>
+            <a:r>
+              <a:rPr lang="nl-BE" sz="2000" dirty="0"/>
+              <a:t> diverse</a:t>
+            </a:r>
+          </a:p>
+          <a:p>
+            <a:pPr marL="457200" indent="-457200"/>
+            <a:endParaRPr lang="nl-BE" sz="1600" dirty="0"/>
+          </a:p>
+          <a:p>
+            <a:pPr lvl="1" indent="0">
+              <a:buNone/>
+            </a:pPr>
+            <a:endParaRPr lang="nl-BE" dirty="0"/>
+          </a:p>
+        </p:txBody>
+      </p:sp>
+      <p:pic>
+        <p:nvPicPr>
+          <p:cNvPr id="12" name="Content Placeholder 11">
+            <a:extLst>
+              <a:ext uri="{FF2B5EF4-FFF2-40B4-BE49-F238E27FC236}">
+                <a16:creationId xmlns:a16="http://schemas.microsoft.com/office/drawing/2014/main" id="{A2FF5567-05C8-44D4-B479-41A7FEA36984}"/>
+              </a:ext>
+            </a:extLst>
+          </p:cNvPr>
+          <p:cNvPicPr>
+            <a:picLocks noGrp="1" noChangeAspect="1"/>
+          </p:cNvPicPr>
+          <p:nvPr>
+            <p:ph sz="half" idx="13"/>
+          </p:nvPr>
+        </p:nvPicPr>
+        <p:blipFill>
+          <a:blip r:embed="rId2">
+            <a:extLst>
+              <a:ext uri="{28A0092B-C50C-407E-A947-70E740481C1C}">
+                <a14:useLocalDpi xmlns:a14="http://schemas.microsoft.com/office/drawing/2010/main" val="0"/>
+              </a:ext>
+            </a:extLst>
+          </a:blip>
+          <a:stretch>
+            <a:fillRect/>
+          </a:stretch>
+        </p:blipFill>
+        <p:spPr>
+          <a:xfrm>
+            <a:off x="4349750" y="3000640"/>
+            <a:ext cx="3068638" cy="2045758"/>
+          </a:xfrm>
+        </p:spPr>
+      </p:pic>
+      <p:pic>
+        <p:nvPicPr>
+          <p:cNvPr id="14" name="Content Placeholder 13">
+            <a:extLst>
+              <a:ext uri="{FF2B5EF4-FFF2-40B4-BE49-F238E27FC236}">
+                <a16:creationId xmlns:a16="http://schemas.microsoft.com/office/drawing/2014/main" id="{93F63593-3E6F-4A31-832F-DB8CF201CE96}"/>
+              </a:ext>
+            </a:extLst>
+          </p:cNvPr>
+          <p:cNvPicPr>
+            <a:picLocks noGrp="1" noChangeAspect="1"/>
+          </p:cNvPicPr>
+          <p:nvPr>
+            <p:ph sz="half" idx="14"/>
+          </p:nvPr>
+        </p:nvPicPr>
+        <p:blipFill>
+          <a:blip r:embed="rId3">
+            <a:extLst>
+              <a:ext uri="{28A0092B-C50C-407E-A947-70E740481C1C}">
+                <a14:useLocalDpi xmlns:a14="http://schemas.microsoft.com/office/drawing/2010/main" val="0"/>
+              </a:ext>
+            </a:extLst>
+          </a:blip>
+          <a:stretch>
+            <a:fillRect/>
+          </a:stretch>
+        </p:blipFill>
+        <p:spPr>
+          <a:xfrm>
+            <a:off x="7861156" y="3001602"/>
+            <a:ext cx="3067193" cy="2044796"/>
+          </a:xfrm>
+        </p:spPr>
+      </p:pic>
+      <p:sp>
+        <p:nvSpPr>
+          <p:cNvPr id="6" name="Slide Number Placeholder 5">
+            <a:extLst>
+              <a:ext uri="{FF2B5EF4-FFF2-40B4-BE49-F238E27FC236}">
+                <a16:creationId xmlns:a16="http://schemas.microsoft.com/office/drawing/2014/main" id="{32261C80-F84E-494C-9A4E-C5C834924F2B}"/>
+              </a:ext>
+            </a:extLst>
+          </p:cNvPr>
+          <p:cNvSpPr>
+            <a:spLocks noGrp="1"/>
+          </p:cNvSpPr>
+          <p:nvPr>
+            <p:ph type="sldNum" sz="quarter" idx="16"/>
+          </p:nvPr>
+        </p:nvSpPr>
+        <p:spPr/>
+        <p:txBody>
+          <a:bodyPr/>
+          <a:lstStyle/>
+          <a:p>
+            <a:fld id="{B4304DBC-6969-41C2-9095-F1F569D43297}" type="slidenum">
+              <a:rPr lang="en-GB" smtClean="0"/>
+              <a:t>1</a:t>
+            </a:fld>
+            <a:endParaRPr lang="en-GB"/>
+          </a:p>
+        </p:txBody>
+      </p:sp>
+      <p:pic>
+        <p:nvPicPr>
+          <p:cNvPr id="16" name="Picture 15">
+            <a:extLst>
+              <a:ext uri="{FF2B5EF4-FFF2-40B4-BE49-F238E27FC236}">
+                <a16:creationId xmlns:a16="http://schemas.microsoft.com/office/drawing/2014/main" id="{B531FD6C-9136-42FB-8D7E-C6C2E79D6828}"/>
+              </a:ext>
+            </a:extLst>
+          </p:cNvPr>
+          <p:cNvPicPr>
+            <a:picLocks noChangeAspect="1"/>
+          </p:cNvPicPr>
+          <p:nvPr/>
+        </p:nvPicPr>
+        <p:blipFill>
+          <a:blip r:embed="rId4">
+            <a:extLst>
+              <a:ext uri="{28A0092B-C50C-407E-A947-70E740481C1C}">
+                <a14:useLocalDpi xmlns:a14="http://schemas.microsoft.com/office/drawing/2010/main" val="0"/>
+              </a:ext>
+            </a:extLst>
+          </a:blip>
+          <a:stretch>
+            <a:fillRect/>
+          </a:stretch>
+        </p:blipFill>
+        <p:spPr>
+          <a:xfrm>
+            <a:off x="10928349" y="102293"/>
+            <a:ext cx="1257300" cy="1203960"/>
+          </a:xfrm>
+          <a:prstGeom prst="rect">
+            <a:avLst/>
+          </a:prstGeom>
+        </p:spPr>
+      </p:pic>
+      <p:pic>
+        <p:nvPicPr>
+          <p:cNvPr id="1026" name="Picture 2" descr="Afbeeldingsresultaat voor logo nasa">
+            <a:extLst>
+              <a:ext uri="{FF2B5EF4-FFF2-40B4-BE49-F238E27FC236}">
+                <a16:creationId xmlns:a16="http://schemas.microsoft.com/office/drawing/2014/main" id="{F133172E-427B-4EB0-81E8-A49CDB21C32D}"/>
+              </a:ext>
+            </a:extLst>
+          </p:cNvPr>
+          <p:cNvPicPr>
+            <a:picLocks noChangeAspect="1" noChangeArrowheads="1"/>
+          </p:cNvPicPr>
+          <p:nvPr/>
+        </p:nvPicPr>
+        <p:blipFill>
+          <a:blip r:embed="rId5">
+            <a:extLst>
+              <a:ext uri="{BEBA8EAE-BF5A-486C-A8C5-ECC9F3942E4B}">
+                <a14:imgProps xmlns:a14="http://schemas.microsoft.com/office/drawing/2010/main">
+                  <a14:imgLayer r:embed="rId6">
+                    <a14:imgEffect>
+                      <a14:backgroundRemoval t="6501" b="95220" l="3594" r="90000">
+                        <a14:foregroundMark x1="40000" y1="6692" x2="54844" y2="9369"/>
+                        <a14:foregroundMark x1="39063" y1="89675" x2="48125" y2="95602"/>
+                        <a14:foregroundMark x1="48125" y1="95602" x2="56875" y2="95602"/>
+                        <a14:foregroundMark x1="56875" y1="95602" x2="63125" y2="90822"/>
+                        <a14:foregroundMark x1="21406" y1="29063" x2="19688" y2="54493"/>
+                        <a14:foregroundMark x1="19688" y1="54493" x2="27187" y2="42256"/>
+                        <a14:foregroundMark x1="27187" y1="42256" x2="23750" y2="53920"/>
+                        <a14:foregroundMark x1="23750" y1="53920" x2="36094" y2="53920"/>
+                        <a14:foregroundMark x1="36094" y1="53920" x2="56094" y2="45698"/>
+                        <a14:foregroundMark x1="56094" y1="45698" x2="44219" y2="43212"/>
+                        <a14:foregroundMark x1="44219" y1="43212" x2="60313" y2="44168"/>
+                        <a14:foregroundMark x1="60313" y1="44168" x2="71094" y2="39197"/>
+                        <a14:foregroundMark x1="71094" y1="39197" x2="43906" y2="47228"/>
+                        <a14:foregroundMark x1="43906" y1="47228" x2="53438" y2="56023"/>
+                        <a14:foregroundMark x1="53438" y1="56023" x2="65000" y2="53920"/>
+                        <a14:foregroundMark x1="65000" y1="53920" x2="61563" y2="63098"/>
+                        <a14:foregroundMark x1="61563" y1="63098" x2="61563" y2="66922"/>
+                        <a14:foregroundMark x1="45000" y1="31549" x2="41563" y2="53346"/>
+                        <a14:foregroundMark x1="41563" y1="53346" x2="45625" y2="62906"/>
+                        <a14:foregroundMark x1="45625" y1="62906" x2="56406" y2="67304"/>
+                        <a14:foregroundMark x1="56406" y1="67304" x2="67500" y2="60994"/>
+                        <a14:foregroundMark x1="67500" y1="60994" x2="69531" y2="49522"/>
+                        <a14:foregroundMark x1="69531" y1="49522" x2="61563" y2="33652"/>
+                        <a14:foregroundMark x1="61563" y1="33652" x2="50313" y2="30784"/>
+                        <a14:foregroundMark x1="50313" y1="30784" x2="44531" y2="39771"/>
+                        <a14:foregroundMark x1="44531" y1="39771" x2="48750" y2="50478"/>
+                        <a14:foregroundMark x1="48750" y1="50478" x2="59375" y2="56788"/>
+                        <a14:foregroundMark x1="59375" y1="56788" x2="78750" y2="60421"/>
+                        <a14:foregroundMark x1="78750" y1="60421" x2="85469" y2="55067"/>
+                        <a14:foregroundMark x1="85469" y1="55067" x2="79844" y2="44742"/>
+                        <a14:foregroundMark x1="79844" y1="44742" x2="68281" y2="42447"/>
+                        <a14:foregroundMark x1="68281" y1="42447" x2="59688" y2="52199"/>
+                        <a14:foregroundMark x1="59688" y1="52199" x2="56563" y2="64627"/>
+                        <a14:foregroundMark x1="56563" y1="64627" x2="48438" y2="70746"/>
+                        <a14:foregroundMark x1="48438" y1="70746" x2="48438" y2="71702"/>
+                        <a14:foregroundMark x1="77031" y1="40918" x2="75313" y2="54876"/>
+                        <a14:foregroundMark x1="75313" y1="54876" x2="73281" y2="41300"/>
+                        <a14:foregroundMark x1="73281" y1="41300" x2="72813" y2="52008"/>
+                        <a14:foregroundMark x1="72813" y1="52008" x2="78906" y2="60612"/>
+                        <a14:foregroundMark x1="78906" y1="60612" x2="74844" y2="44359"/>
+                        <a14:foregroundMark x1="74844" y1="44359" x2="75469" y2="56405"/>
+                        <a14:foregroundMark x1="75469" y1="56405" x2="75781" y2="53155"/>
+                        <a14:foregroundMark x1="36719" y1="53537" x2="40625" y2="61950"/>
+                        <a14:foregroundMark x1="40625" y1="61950" x2="40469" y2="58126"/>
+                        <a14:foregroundMark x1="32500" y1="43212" x2="31875" y2="54111"/>
+                        <a14:foregroundMark x1="31875" y1="54111" x2="32969" y2="40918"/>
+                        <a14:foregroundMark x1="32969" y1="40918" x2="32344" y2="40918"/>
+                        <a14:foregroundMark x1="8594" y1="60994" x2="8594" y2="60994"/>
+                        <a14:foregroundMark x1="5313" y1="66348" x2="5313" y2="66348"/>
+                        <a14:foregroundMark x1="22969" y1="54493" x2="20469" y2="57170"/>
+                        <a14:foregroundMark x1="3594" y1="68642" x2="3594" y2="68642"/>
+                      </a14:backgroundRemoval>
+                    </a14:imgEffect>
+                  </a14:imgLayer>
+                </a14:imgProps>
+              </a:ext>
+              <a:ext uri="{28A0092B-C50C-407E-A947-70E740481C1C}">
+                <a14:useLocalDpi xmlns:a14="http://schemas.microsoft.com/office/drawing/2010/main" val="0"/>
+              </a:ext>
+            </a:extLst>
+          </a:blip>
+          <a:srcRect/>
+          <a:stretch>
+            <a:fillRect/>
+          </a:stretch>
+        </p:blipFill>
+        <p:spPr bwMode="auto">
+          <a:xfrm>
+            <a:off x="157018" y="77802"/>
+            <a:ext cx="766618" cy="626471"/>
+          </a:xfrm>
+          <a:prstGeom prst="rect">
+            <a:avLst/>
+          </a:prstGeom>
+          <a:noFill/>
+          <a:extLst>
+            <a:ext uri="{909E8E84-426E-40DD-AFC4-6F175D3DCCD1}">
+              <a14:hiddenFill xmlns:a14="http://schemas.microsoft.com/office/drawing/2010/main">
+                <a:solidFill>
+                  <a:srgbClr val="FFFFFF"/>
+                </a:solidFill>
+              </a14:hiddenFill>
+            </a:ext>
+          </a:extLst>
+        </p:spPr>
+      </p:pic>
+      <p:sp>
+        <p:nvSpPr>
+          <p:cNvPr id="19" name="TextBox 18">
+            <a:extLst>
+              <a:ext uri="{FF2B5EF4-FFF2-40B4-BE49-F238E27FC236}">
+                <a16:creationId xmlns:a16="http://schemas.microsoft.com/office/drawing/2014/main" id="{645C10A5-DE81-4414-AFB9-3F3088D19473}"/>
+              </a:ext>
+            </a:extLst>
+          </p:cNvPr>
+          <p:cNvSpPr txBox="1"/>
+          <p:nvPr/>
+        </p:nvSpPr>
+        <p:spPr>
+          <a:xfrm>
+            <a:off x="55423" y="630385"/>
+            <a:ext cx="1173018" cy="184666"/>
+          </a:xfrm>
+          <a:prstGeom prst="rect">
+            <a:avLst/>
+          </a:prstGeom>
+          <a:noFill/>
+        </p:spPr>
+        <p:txBody>
+          <a:bodyPr wrap="square" rtlCol="0">
+            <a:spAutoFit/>
+          </a:bodyPr>
+          <a:lstStyle/>
+          <a:p>
+            <a:r>
+              <a:rPr lang="nl-BE" sz="600" b="1" dirty="0"/>
+              <a:t>Goddard Space Flight Center</a:t>
+            </a:r>
+            <a:endParaRPr lang="en-GB" sz="600" b="1" dirty="0"/>
+          </a:p>
+        </p:txBody>
+      </p:sp>
+      <p:sp>
+        <p:nvSpPr>
+          <p:cNvPr id="20" name="TextBox 19">
+            <a:extLst>
+              <a:ext uri="{FF2B5EF4-FFF2-40B4-BE49-F238E27FC236}">
+                <a16:creationId xmlns:a16="http://schemas.microsoft.com/office/drawing/2014/main" id="{34930DD0-8D65-45CE-97DA-E7FACA0AF029}"/>
+              </a:ext>
+            </a:extLst>
+          </p:cNvPr>
+          <p:cNvSpPr txBox="1"/>
+          <p:nvPr/>
+        </p:nvSpPr>
+        <p:spPr>
+          <a:xfrm>
+            <a:off x="4349606" y="5227782"/>
+            <a:ext cx="3068782" cy="369454"/>
+          </a:xfrm>
+          <a:prstGeom prst="rect">
+            <a:avLst/>
+          </a:prstGeom>
+          <a:noFill/>
+        </p:spPr>
+        <p:txBody>
+          <a:bodyPr wrap="square" rtlCol="0">
+            <a:spAutoFit/>
+          </a:bodyPr>
+          <a:lstStyle/>
+          <a:p>
+            <a:r>
+              <a:rPr lang="nl-BE" dirty="0" err="1"/>
+              <a:t>Fastener</a:t>
+            </a:r>
+            <a:r>
+              <a:rPr lang="nl-BE" dirty="0"/>
+              <a:t> </a:t>
+            </a:r>
+            <a:r>
+              <a:rPr lang="nl-BE" dirty="0" err="1"/>
+              <a:t>removal</a:t>
+            </a:r>
+            <a:r>
+              <a:rPr lang="nl-BE" dirty="0"/>
+              <a:t> in NBL</a:t>
+            </a:r>
+            <a:endParaRPr lang="en-GB" dirty="0"/>
+          </a:p>
+        </p:txBody>
+      </p:sp>
+      <p:sp>
+        <p:nvSpPr>
+          <p:cNvPr id="23" name="TextBox 22">
+            <a:extLst>
+              <a:ext uri="{FF2B5EF4-FFF2-40B4-BE49-F238E27FC236}">
+                <a16:creationId xmlns:a16="http://schemas.microsoft.com/office/drawing/2014/main" id="{D5EAA93A-9002-42B4-9639-5480C02F27E8}"/>
+              </a:ext>
+            </a:extLst>
+          </p:cNvPr>
+          <p:cNvSpPr txBox="1"/>
+          <p:nvPr/>
+        </p:nvSpPr>
+        <p:spPr>
+          <a:xfrm>
+            <a:off x="7859567" y="5237018"/>
+            <a:ext cx="3068782" cy="369454"/>
+          </a:xfrm>
+          <a:prstGeom prst="rect">
+            <a:avLst/>
+          </a:prstGeom>
+          <a:noFill/>
+        </p:spPr>
+        <p:txBody>
+          <a:bodyPr wrap="square" rtlCol="0">
+            <a:spAutoFit/>
+          </a:bodyPr>
+          <a:lstStyle/>
+          <a:p>
+            <a:r>
+              <a:rPr lang="nl-BE" dirty="0" err="1"/>
+              <a:t>Fastener</a:t>
+            </a:r>
+            <a:r>
+              <a:rPr lang="nl-BE" dirty="0"/>
+              <a:t> </a:t>
+            </a:r>
+            <a:r>
+              <a:rPr lang="nl-BE" dirty="0" err="1"/>
+              <a:t>removal</a:t>
+            </a:r>
+            <a:r>
+              <a:rPr lang="nl-BE" dirty="0"/>
+              <a:t> in NBL</a:t>
+            </a:r>
+            <a:endParaRPr lang="en-GB" dirty="0"/>
+          </a:p>
+        </p:txBody>
+      </p:sp>
+    </p:spTree>
+    <p:extLst>
+      <p:ext uri="{BB962C8B-B14F-4D97-AF65-F5344CB8AC3E}">
+        <p14:creationId xmlns:p14="http://schemas.microsoft.com/office/powerpoint/2010/main" val="4126946042"/>
+      </p:ext>
+    </p:extLst>
+  </p:cSld>
+  <p:clrMapOvr>
+    <a:masterClrMapping/>
+  </p:clrMapOvr>
+</p:sld>
 </file>
 
 <file path=ppt/theme/theme1.xml><?xml version="1.0" encoding="utf-8"?>

</xml_diff>